<commit_message>
Add the EnumSet into pptx
</commit_message>
<xml_diff>
--- a/JavaStudy/JavaStudyNote/Collection-Map/Java_Set.pptx
+++ b/JavaStudy/JavaStudyNote/Collection-Map/Java_Set.pptx
@@ -9,6 +9,8 @@
     <p:sldId id="257" r:id="rId3"/>
     <p:sldId id="258" r:id="rId4"/>
     <p:sldId id="259" r:id="rId5"/>
+    <p:sldId id="260" r:id="rId6"/>
+    <p:sldId id="261" r:id="rId7"/>
   </p:sldIdLst>
   <p:sldSz cx="12192000" cy="6858000"/>
   <p:notesSz cx="6858000" cy="9144000"/>
@@ -262,7 +264,7 @@
           <a:p>
             <a:fld id="{F7D1681C-D9E7-4188-8C9F-C923B7158E01}" type="datetimeFigureOut">
               <a:rPr lang="zh-TW" altLang="en-US" smtClean="0"/>
-              <a:t>2023/1/27</a:t>
+              <a:t>2023/2/1</a:t>
             </a:fld>
             <a:endParaRPr lang="zh-TW" altLang="en-US"/>
           </a:p>
@@ -460,7 +462,7 @@
           <a:p>
             <a:fld id="{F7D1681C-D9E7-4188-8C9F-C923B7158E01}" type="datetimeFigureOut">
               <a:rPr lang="zh-TW" altLang="en-US" smtClean="0"/>
-              <a:t>2023/1/27</a:t>
+              <a:t>2023/2/1</a:t>
             </a:fld>
             <a:endParaRPr lang="zh-TW" altLang="en-US"/>
           </a:p>
@@ -668,7 +670,7 @@
           <a:p>
             <a:fld id="{F7D1681C-D9E7-4188-8C9F-C923B7158E01}" type="datetimeFigureOut">
               <a:rPr lang="zh-TW" altLang="en-US" smtClean="0"/>
-              <a:t>2023/1/27</a:t>
+              <a:t>2023/2/1</a:t>
             </a:fld>
             <a:endParaRPr lang="zh-TW" altLang="en-US"/>
           </a:p>
@@ -866,7 +868,7 @@
           <a:p>
             <a:fld id="{F7D1681C-D9E7-4188-8C9F-C923B7158E01}" type="datetimeFigureOut">
               <a:rPr lang="zh-TW" altLang="en-US" smtClean="0"/>
-              <a:t>2023/1/27</a:t>
+              <a:t>2023/2/1</a:t>
             </a:fld>
             <a:endParaRPr lang="zh-TW" altLang="en-US"/>
           </a:p>
@@ -1141,7 +1143,7 @@
           <a:p>
             <a:fld id="{F7D1681C-D9E7-4188-8C9F-C923B7158E01}" type="datetimeFigureOut">
               <a:rPr lang="zh-TW" altLang="en-US" smtClean="0"/>
-              <a:t>2023/1/27</a:t>
+              <a:t>2023/2/1</a:t>
             </a:fld>
             <a:endParaRPr lang="zh-TW" altLang="en-US"/>
           </a:p>
@@ -1406,7 +1408,7 @@
           <a:p>
             <a:fld id="{F7D1681C-D9E7-4188-8C9F-C923B7158E01}" type="datetimeFigureOut">
               <a:rPr lang="zh-TW" altLang="en-US" smtClean="0"/>
-              <a:t>2023/1/27</a:t>
+              <a:t>2023/2/1</a:t>
             </a:fld>
             <a:endParaRPr lang="zh-TW" altLang="en-US"/>
           </a:p>
@@ -1818,7 +1820,7 @@
           <a:p>
             <a:fld id="{F7D1681C-D9E7-4188-8C9F-C923B7158E01}" type="datetimeFigureOut">
               <a:rPr lang="zh-TW" altLang="en-US" smtClean="0"/>
-              <a:t>2023/1/27</a:t>
+              <a:t>2023/2/1</a:t>
             </a:fld>
             <a:endParaRPr lang="zh-TW" altLang="en-US"/>
           </a:p>
@@ -1959,7 +1961,7 @@
           <a:p>
             <a:fld id="{F7D1681C-D9E7-4188-8C9F-C923B7158E01}" type="datetimeFigureOut">
               <a:rPr lang="zh-TW" altLang="en-US" smtClean="0"/>
-              <a:t>2023/1/27</a:t>
+              <a:t>2023/2/1</a:t>
             </a:fld>
             <a:endParaRPr lang="zh-TW" altLang="en-US"/>
           </a:p>
@@ -2072,7 +2074,7 @@
           <a:p>
             <a:fld id="{F7D1681C-D9E7-4188-8C9F-C923B7158E01}" type="datetimeFigureOut">
               <a:rPr lang="zh-TW" altLang="en-US" smtClean="0"/>
-              <a:t>2023/1/27</a:t>
+              <a:t>2023/2/1</a:t>
             </a:fld>
             <a:endParaRPr lang="zh-TW" altLang="en-US"/>
           </a:p>
@@ -2383,7 +2385,7 @@
           <a:p>
             <a:fld id="{F7D1681C-D9E7-4188-8C9F-C923B7158E01}" type="datetimeFigureOut">
               <a:rPr lang="zh-TW" altLang="en-US" smtClean="0"/>
-              <a:t>2023/1/27</a:t>
+              <a:t>2023/2/1</a:t>
             </a:fld>
             <a:endParaRPr lang="zh-TW" altLang="en-US"/>
           </a:p>
@@ -2671,7 +2673,7 @@
           <a:p>
             <a:fld id="{F7D1681C-D9E7-4188-8C9F-C923B7158E01}" type="datetimeFigureOut">
               <a:rPr lang="zh-TW" altLang="en-US" smtClean="0"/>
-              <a:t>2023/1/27</a:t>
+              <a:t>2023/2/1</a:t>
             </a:fld>
             <a:endParaRPr lang="zh-TW" altLang="en-US"/>
           </a:p>
@@ -2912,7 +2914,7 @@
           <a:p>
             <a:fld id="{F7D1681C-D9E7-4188-8C9F-C923B7158E01}" type="datetimeFigureOut">
               <a:rPr lang="zh-TW" altLang="en-US" smtClean="0"/>
-              <a:t>2023/1/27</a:t>
+              <a:t>2023/2/1</a:t>
             </a:fld>
             <a:endParaRPr lang="zh-TW" altLang="en-US"/>
           </a:p>
@@ -4313,6 +4315,795 @@
 </p:sld>
 </file>
 
+<file path=ppt/slides/slide5.xml><?xml version="1.0" encoding="utf-8"?>
+<p:sld xmlns:a="http://schemas.openxmlformats.org/drawingml/2006/main" xmlns:r="http://schemas.openxmlformats.org/officeDocument/2006/relationships" xmlns:p="http://schemas.openxmlformats.org/presentationml/2006/main">
+  <p:cSld>
+    <p:spTree>
+      <p:nvGrpSpPr>
+        <p:cNvPr id="1" name=""/>
+        <p:cNvGrpSpPr/>
+        <p:nvPr/>
+      </p:nvGrpSpPr>
+      <p:grpSpPr>
+        <a:xfrm>
+          <a:off x="0" y="0"/>
+          <a:ext cx="0" cy="0"/>
+          <a:chOff x="0" y="0"/>
+          <a:chExt cx="0" cy="0"/>
+        </a:xfrm>
+      </p:grpSpPr>
+      <p:sp>
+        <p:nvSpPr>
+          <p:cNvPr id="4" name="文字方塊 3">
+            <a:extLst>
+              <a:ext uri="{FF2B5EF4-FFF2-40B4-BE49-F238E27FC236}">
+                <a16:creationId xmlns:a16="http://schemas.microsoft.com/office/drawing/2014/main" id="{ED91EA17-4F3E-407C-8EB2-E9482DB3E137}"/>
+              </a:ext>
+            </a:extLst>
+          </p:cNvPr>
+          <p:cNvSpPr txBox="1"/>
+          <p:nvPr/>
+        </p:nvSpPr>
+        <p:spPr>
+          <a:xfrm>
+            <a:off x="111760" y="121920"/>
+            <a:ext cx="11196320" cy="400110"/>
+          </a:xfrm>
+          <a:prstGeom prst="rect">
+            <a:avLst/>
+          </a:prstGeom>
+          <a:noFill/>
+        </p:spPr>
+        <p:txBody>
+          <a:bodyPr wrap="square" rtlCol="0">
+            <a:spAutoFit/>
+          </a:bodyPr>
+          <a:lstStyle/>
+          <a:p>
+            <a:r>
+              <a:rPr lang="en-US" altLang="zh-TW" sz="2000" b="1" u="sng" dirty="0" err="1"/>
+              <a:t>EnumSet</a:t>
+            </a:r>
+            <a:endParaRPr lang="zh-TW" altLang="en-US" sz="2000" b="1" u="sng" dirty="0"/>
+          </a:p>
+        </p:txBody>
+      </p:sp>
+      <p:sp>
+        <p:nvSpPr>
+          <p:cNvPr id="5" name="文字方塊 4">
+            <a:extLst>
+              <a:ext uri="{FF2B5EF4-FFF2-40B4-BE49-F238E27FC236}">
+                <a16:creationId xmlns:a16="http://schemas.microsoft.com/office/drawing/2014/main" id="{2B132731-70B2-4EBB-B58E-06FB30A5202F}"/>
+              </a:ext>
+            </a:extLst>
+          </p:cNvPr>
+          <p:cNvSpPr txBox="1"/>
+          <p:nvPr/>
+        </p:nvSpPr>
+        <p:spPr>
+          <a:xfrm>
+            <a:off x="782320" y="629920"/>
+            <a:ext cx="11196320" cy="4801314"/>
+          </a:xfrm>
+          <a:prstGeom prst="rect">
+            <a:avLst/>
+          </a:prstGeom>
+          <a:noFill/>
+        </p:spPr>
+        <p:txBody>
+          <a:bodyPr wrap="square" rtlCol="0">
+            <a:spAutoFit/>
+          </a:bodyPr>
+          <a:lstStyle/>
+          <a:p>
+            <a:pPr marL="342900" indent="-342900">
+              <a:buAutoNum type="arabicPeriod"/>
+            </a:pPr>
+            <a:r>
+              <a:rPr lang="zh-CN" altLang="en-US" b="1" dirty="0"/>
+              <a:t>什麽是</a:t>
+            </a:r>
+            <a:r>
+              <a:rPr lang="en-US" altLang="zh-CN" b="1" dirty="0" err="1"/>
+              <a:t>EnumSet</a:t>
+            </a:r>
+            <a:r>
+              <a:rPr lang="en-US" altLang="zh-CN" b="1" dirty="0"/>
+              <a:t>?</a:t>
+            </a:r>
+          </a:p>
+          <a:p>
+            <a:r>
+              <a:rPr lang="en-US" altLang="zh-CN" dirty="0"/>
+              <a:t>           </a:t>
+            </a:r>
+            <a:r>
+              <a:rPr lang="en-US" altLang="zh-CN" dirty="0" err="1"/>
+              <a:t>EnumSet</a:t>
+            </a:r>
+            <a:r>
+              <a:rPr lang="zh-CN" altLang="en-US" dirty="0"/>
+              <a:t>是一个专为枚举类设计的集合类，</a:t>
+            </a:r>
+            <a:r>
+              <a:rPr lang="en-US" altLang="zh-CN" dirty="0" err="1"/>
+              <a:t>EnumSet</a:t>
+            </a:r>
+            <a:r>
+              <a:rPr lang="zh-CN" altLang="en-US" dirty="0"/>
+              <a:t>中的所有元素都必须是指定枚举类型的枚举值，该枚</a:t>
+            </a:r>
+            <a:endParaRPr lang="en-US" altLang="zh-CN" dirty="0"/>
+          </a:p>
+          <a:p>
+            <a:r>
+              <a:rPr lang="en-US" altLang="zh-CN" dirty="0"/>
+              <a:t>           </a:t>
+            </a:r>
+            <a:r>
+              <a:rPr lang="zh-CN" altLang="en-US" dirty="0"/>
+              <a:t>举类型在创建</a:t>
+            </a:r>
+            <a:r>
+              <a:rPr lang="en-US" altLang="zh-CN" dirty="0" err="1"/>
+              <a:t>EnumSet</a:t>
+            </a:r>
+            <a:r>
+              <a:rPr lang="zh-CN" altLang="en-US" dirty="0"/>
+              <a:t>时显式或</a:t>
+            </a:r>
+            <a:r>
+              <a:rPr lang="zh-TW" altLang="en-US" dirty="0"/>
+              <a:t>隐式地指定。</a:t>
+            </a:r>
+            <a:r>
+              <a:rPr lang="en-US" altLang="zh-TW" dirty="0" err="1"/>
+              <a:t>EnumSet</a:t>
+            </a:r>
+            <a:r>
+              <a:rPr lang="zh-TW" altLang="en-US" dirty="0"/>
+              <a:t>的集合元素也是有序的，</a:t>
+            </a:r>
+            <a:r>
+              <a:rPr lang="en-US" altLang="zh-TW" dirty="0" err="1"/>
+              <a:t>EnumSet</a:t>
+            </a:r>
+            <a:r>
+              <a:rPr lang="zh-TW" altLang="en-US" dirty="0"/>
+              <a:t>以枚举值在</a:t>
+            </a:r>
+            <a:r>
+              <a:rPr lang="en-US" altLang="zh-CN" dirty="0" err="1"/>
+              <a:t>Enum</a:t>
+            </a:r>
+            <a:r>
+              <a:rPr lang="en-US" altLang="zh-CN" dirty="0"/>
+              <a:t>  </a:t>
+            </a:r>
+          </a:p>
+          <a:p>
+            <a:r>
+              <a:rPr lang="en-US" altLang="zh-CN" dirty="0"/>
+              <a:t>           </a:t>
+            </a:r>
+            <a:r>
+              <a:rPr lang="zh-CN" altLang="en-US" dirty="0"/>
+              <a:t>类内的定义顺序来决定集合元素的顺序。</a:t>
+            </a:r>
+            <a:endParaRPr lang="en-US" altLang="zh-CN" dirty="0"/>
+          </a:p>
+          <a:p>
+            <a:endParaRPr lang="en-US" altLang="zh-TW" dirty="0"/>
+          </a:p>
+          <a:p>
+            <a:pPr marL="342900" indent="-342900">
+              <a:buAutoNum type="arabicPeriod" startAt="2"/>
+            </a:pPr>
+            <a:r>
+              <a:rPr lang="en-US" altLang="zh-TW" b="1" dirty="0" err="1"/>
+              <a:t>EnumSet</a:t>
+            </a:r>
+            <a:r>
+              <a:rPr lang="zh-CN" altLang="en-US" b="1" dirty="0"/>
+              <a:t>特點</a:t>
+            </a:r>
+            <a:r>
+              <a:rPr lang="en-US" altLang="zh-CN" b="1" dirty="0"/>
+              <a:t>?</a:t>
+            </a:r>
+          </a:p>
+          <a:p>
+            <a:r>
+              <a:rPr lang="en-US" altLang="zh-TW" b="1" dirty="0"/>
+              <a:t>            </a:t>
+            </a:r>
+            <a:r>
+              <a:rPr lang="en-US" altLang="zh-CN" dirty="0" err="1"/>
+              <a:t>EnumSet</a:t>
+            </a:r>
+            <a:r>
+              <a:rPr lang="zh-CN" altLang="en-US" dirty="0"/>
+              <a:t>集合不允许加入</a:t>
+            </a:r>
+            <a:r>
+              <a:rPr lang="en-US" altLang="zh-CN" dirty="0"/>
+              <a:t>null</a:t>
+            </a:r>
+            <a:r>
+              <a:rPr lang="zh-CN" altLang="en-US" dirty="0"/>
+              <a:t>元素，如果试图插入</a:t>
+            </a:r>
+            <a:r>
+              <a:rPr lang="en-US" altLang="zh-CN" dirty="0"/>
+              <a:t>null</a:t>
+            </a:r>
+            <a:r>
+              <a:rPr lang="zh-CN" altLang="en-US" dirty="0"/>
+              <a:t>元素，</a:t>
+            </a:r>
+            <a:r>
+              <a:rPr lang="en-US" altLang="zh-TW" dirty="0" err="1"/>
+              <a:t>EnumSet</a:t>
+            </a:r>
+            <a:r>
+              <a:rPr lang="zh-TW" altLang="en-US" dirty="0"/>
+              <a:t>将抛出</a:t>
+            </a:r>
+            <a:r>
+              <a:rPr lang="en-US" altLang="zh-TW" dirty="0" err="1"/>
+              <a:t>NullPointerException</a:t>
+            </a:r>
+            <a:r>
+              <a:rPr lang="zh-TW" altLang="en-US" dirty="0"/>
+              <a:t>异常。如 </a:t>
+            </a:r>
+            <a:endParaRPr lang="en-US" altLang="zh-TW" dirty="0"/>
+          </a:p>
+          <a:p>
+            <a:r>
+              <a:rPr lang="en-US" altLang="zh-TW" dirty="0"/>
+              <a:t>           </a:t>
+            </a:r>
+            <a:r>
+              <a:rPr lang="zh-TW" altLang="en-US" dirty="0"/>
+              <a:t>果只是想判断</a:t>
+            </a:r>
+            <a:r>
+              <a:rPr lang="en-US" altLang="zh-TW" dirty="0" err="1"/>
+              <a:t>EnumSet</a:t>
+            </a:r>
+            <a:r>
+              <a:rPr lang="zh-CN" altLang="en-US" dirty="0"/>
+              <a:t>是否包含</a:t>
+            </a:r>
+            <a:r>
+              <a:rPr lang="en-US" altLang="zh-CN" dirty="0"/>
+              <a:t>null</a:t>
+            </a:r>
+            <a:r>
+              <a:rPr lang="zh-CN" altLang="en-US" dirty="0"/>
+              <a:t>元素或试图删除</a:t>
+            </a:r>
+            <a:r>
+              <a:rPr lang="en-US" altLang="zh-CN" dirty="0"/>
+              <a:t>null</a:t>
+            </a:r>
+            <a:r>
+              <a:rPr lang="zh-CN" altLang="en-US" dirty="0"/>
+              <a:t>元素都不会抛出异常，只是删除操作将返回</a:t>
+            </a:r>
+            <a:r>
+              <a:rPr lang="en-US" altLang="zh-CN" dirty="0"/>
+              <a:t>false</a:t>
+            </a:r>
+            <a:r>
+              <a:rPr lang="zh-CN" altLang="en-US" dirty="0"/>
+              <a:t>，    </a:t>
+            </a:r>
+            <a:endParaRPr lang="en-US" altLang="zh-CN" dirty="0"/>
+          </a:p>
+          <a:p>
+            <a:r>
+              <a:rPr lang="en-US" altLang="zh-CN" dirty="0"/>
+              <a:t>           </a:t>
+            </a:r>
+            <a:r>
+              <a:rPr lang="zh-CN" altLang="en-US" dirty="0"/>
+              <a:t>因为没有任何</a:t>
+            </a:r>
+            <a:r>
+              <a:rPr lang="en-US" altLang="zh-CN" dirty="0"/>
+              <a:t>null</a:t>
+            </a:r>
+            <a:r>
+              <a:rPr lang="zh-CN" altLang="en-US" dirty="0"/>
+              <a:t>元素被删除。</a:t>
+            </a:r>
+            <a:endParaRPr lang="en-US" altLang="zh-CN" dirty="0"/>
+          </a:p>
+          <a:p>
+            <a:endParaRPr lang="en-US" altLang="zh-TW" b="1" dirty="0"/>
+          </a:p>
+          <a:p>
+            <a:pPr marL="342900" indent="-342900">
+              <a:buAutoNum type="arabicPeriod" startAt="3"/>
+            </a:pPr>
+            <a:r>
+              <a:rPr lang="zh-CN" altLang="en-US" b="1" dirty="0"/>
+              <a:t>相關</a:t>
+            </a:r>
+            <a:r>
+              <a:rPr lang="en-US" altLang="zh-CN" b="1" dirty="0"/>
+              <a:t>API</a:t>
+            </a:r>
+            <a:r>
+              <a:rPr lang="zh-CN" altLang="en-US" b="1" dirty="0"/>
+              <a:t>的使用</a:t>
+            </a:r>
+            <a:endParaRPr lang="en-US" altLang="zh-CN" b="1" dirty="0"/>
+          </a:p>
+          <a:p>
+            <a:r>
+              <a:rPr lang="en-US" altLang="zh-TW" b="1" dirty="0"/>
+              <a:t>           </a:t>
+            </a:r>
+            <a:r>
+              <a:rPr lang="en-US" altLang="zh-CN" dirty="0" err="1"/>
+              <a:t>EnumSet.allOf</a:t>
+            </a:r>
+            <a:r>
+              <a:rPr lang="en-US" altLang="zh-CN" dirty="0"/>
+              <a:t>(</a:t>
+            </a:r>
+            <a:r>
+              <a:rPr lang="zh-CN" altLang="en-US" dirty="0"/>
+              <a:t>枚舉類</a:t>
+            </a:r>
+            <a:r>
+              <a:rPr lang="en-US" altLang="zh-CN" dirty="0"/>
+              <a:t>.class);      </a:t>
+            </a:r>
+            <a:r>
+              <a:rPr lang="zh-CN" altLang="en-US" dirty="0"/>
+              <a:t>枚舉類轉化為</a:t>
+            </a:r>
+            <a:r>
+              <a:rPr lang="en-US" altLang="zh-CN" dirty="0" err="1"/>
+              <a:t>Enumset</a:t>
+            </a:r>
+            <a:r>
+              <a:rPr lang="zh-CN" altLang="en-US" dirty="0"/>
+              <a:t>集合</a:t>
+            </a:r>
+            <a:endParaRPr lang="en-US" altLang="zh-CN" dirty="0"/>
+          </a:p>
+          <a:p>
+            <a:r>
+              <a:rPr lang="en-US" altLang="zh-CN" dirty="0"/>
+              <a:t>           </a:t>
+            </a:r>
+            <a:r>
+              <a:rPr lang="en-US" altLang="zh-CN" dirty="0" err="1"/>
+              <a:t>EnumSet.noneOf</a:t>
+            </a:r>
+            <a:r>
+              <a:rPr lang="en-US" altLang="zh-CN" dirty="0"/>
+              <a:t>(</a:t>
+            </a:r>
+            <a:r>
+              <a:rPr lang="zh-CN" altLang="en-US" dirty="0"/>
+              <a:t>枚舉類</a:t>
+            </a:r>
+            <a:r>
+              <a:rPr lang="en-US" altLang="zh-CN" dirty="0"/>
+              <a:t>.class);    </a:t>
+            </a:r>
+            <a:r>
+              <a:rPr lang="zh-CN" altLang="en-US" dirty="0"/>
+              <a:t>創建一個空的</a:t>
+            </a:r>
+            <a:r>
+              <a:rPr lang="en-US" altLang="zh-CN" dirty="0" err="1"/>
+              <a:t>Enumset</a:t>
+            </a:r>
+            <a:r>
+              <a:rPr lang="zh-CN" altLang="en-US" dirty="0"/>
+              <a:t>集合</a:t>
+            </a:r>
+            <a:endParaRPr lang="en-US" altLang="zh-CN" dirty="0"/>
+          </a:p>
+          <a:p>
+            <a:r>
+              <a:rPr lang="en-US" altLang="zh-TW" b="1" dirty="0"/>
+              <a:t>           </a:t>
+            </a:r>
+            <a:r>
+              <a:rPr lang="en-US" altLang="zh-CN" dirty="0" err="1"/>
+              <a:t>EnumSet.of</a:t>
+            </a:r>
+            <a:r>
+              <a:rPr lang="en-US" altLang="zh-CN" dirty="0"/>
+              <a:t>(</a:t>
+            </a:r>
+            <a:r>
+              <a:rPr lang="zh-CN" altLang="en-US" dirty="0"/>
+              <a:t>枚舉類</a:t>
+            </a:r>
+            <a:r>
+              <a:rPr lang="en-US" altLang="zh-CN" dirty="0"/>
+              <a:t>.</a:t>
+            </a:r>
+            <a:r>
+              <a:rPr lang="zh-CN" altLang="en-US" dirty="0"/>
+              <a:t>枚舉類參數</a:t>
+            </a:r>
+            <a:r>
+              <a:rPr lang="en-US" altLang="zh-CN" dirty="0"/>
+              <a:t>, </a:t>
+            </a:r>
+            <a:r>
+              <a:rPr lang="zh-CN" altLang="en-US" dirty="0"/>
+              <a:t>枚舉類</a:t>
+            </a:r>
+            <a:r>
+              <a:rPr lang="en-US" altLang="zh-CN" dirty="0"/>
+              <a:t>.</a:t>
+            </a:r>
+            <a:r>
+              <a:rPr lang="zh-CN" altLang="en-US" dirty="0"/>
+              <a:t>枚舉類參數</a:t>
+            </a:r>
+            <a:r>
+              <a:rPr lang="en-US" altLang="zh-CN" dirty="0"/>
+              <a:t>, …);   </a:t>
+            </a:r>
+            <a:r>
+              <a:rPr lang="zh-CN" altLang="en-US" dirty="0"/>
+              <a:t>指定枚舉類參數創建</a:t>
+            </a:r>
+            <a:r>
+              <a:rPr lang="en-US" altLang="zh-CN" dirty="0" err="1"/>
+              <a:t>Enumset</a:t>
+            </a:r>
+            <a:endParaRPr lang="en-US" altLang="zh-CN" dirty="0"/>
+          </a:p>
+          <a:p>
+            <a:r>
+              <a:rPr lang="en-US" altLang="zh-TW" dirty="0"/>
+              <a:t>           </a:t>
+            </a:r>
+            <a:r>
+              <a:rPr lang="en-US" altLang="zh-TW" dirty="0" err="1"/>
+              <a:t>EnumSet.range</a:t>
+            </a:r>
+            <a:r>
+              <a:rPr lang="en-US" altLang="zh-TW" dirty="0"/>
+              <a:t>(</a:t>
+            </a:r>
+            <a:r>
+              <a:rPr lang="zh-CN" altLang="en-US" dirty="0"/>
+              <a:t>起始枚舉類參數</a:t>
+            </a:r>
+            <a:r>
+              <a:rPr lang="en-US" altLang="zh-CN" dirty="0"/>
+              <a:t>,  </a:t>
+            </a:r>
+            <a:r>
+              <a:rPr lang="zh-CN" altLang="en-US" dirty="0"/>
+              <a:t>結束枚舉類參數</a:t>
+            </a:r>
+            <a:r>
+              <a:rPr lang="en-US" altLang="zh-TW" dirty="0"/>
+              <a:t>);</a:t>
+            </a:r>
+            <a:r>
+              <a:rPr lang="zh-CN" altLang="en-US" dirty="0"/>
+              <a:t>    指定一個範圍創建</a:t>
+            </a:r>
+            <a:r>
+              <a:rPr lang="en-US" altLang="zh-CN" dirty="0" err="1"/>
+              <a:t>Enumset</a:t>
+            </a:r>
+            <a:endParaRPr lang="en-US" altLang="zh-CN" dirty="0"/>
+          </a:p>
+          <a:p>
+            <a:r>
+              <a:rPr lang="en-US" altLang="zh-TW" dirty="0"/>
+              <a:t>           </a:t>
+            </a:r>
+            <a:r>
+              <a:rPr lang="en-US" altLang="zh-CN" dirty="0" err="1"/>
+              <a:t>EnumSet.complementOf</a:t>
+            </a:r>
+            <a:r>
+              <a:rPr lang="en-US" altLang="zh-CN" dirty="0"/>
+              <a:t>(</a:t>
+            </a:r>
+            <a:r>
+              <a:rPr lang="en-US" altLang="zh-CN" dirty="0" err="1"/>
+              <a:t>EnumSet</a:t>
+            </a:r>
+            <a:r>
+              <a:rPr lang="en-US" altLang="zh-CN" dirty="0"/>
+              <a:t>)    </a:t>
+            </a:r>
+            <a:r>
+              <a:rPr lang="zh-CN" altLang="en-US" dirty="0"/>
+              <a:t>創建</a:t>
+            </a:r>
+            <a:r>
+              <a:rPr lang="en-US" altLang="zh-CN" dirty="0"/>
+              <a:t>(</a:t>
+            </a:r>
+            <a:r>
+              <a:rPr lang="en-US" altLang="zh-CN" dirty="0" err="1"/>
+              <a:t>EnumSet</a:t>
+            </a:r>
+            <a:r>
+              <a:rPr lang="en-US" altLang="zh-CN" dirty="0"/>
+              <a:t>)</a:t>
+            </a:r>
+            <a:r>
+              <a:rPr lang="zh-CN" altLang="en-US" dirty="0"/>
+              <a:t>沒有的枚舉類</a:t>
+            </a:r>
+            <a:endParaRPr lang="en-US" altLang="zh-CN" dirty="0"/>
+          </a:p>
+          <a:p>
+            <a:r>
+              <a:rPr lang="en-US" altLang="zh-TW" dirty="0"/>
+              <a:t>           </a:t>
+            </a:r>
+            <a:r>
+              <a:rPr lang="en-US" altLang="zh-CN" dirty="0" err="1"/>
+              <a:t>EnumSet.copyOf</a:t>
+            </a:r>
+            <a:r>
+              <a:rPr lang="en-US" altLang="zh-CN" dirty="0"/>
+              <a:t>(Collection)    </a:t>
+            </a:r>
+            <a:r>
+              <a:rPr lang="zh-CN" altLang="en-US" dirty="0"/>
+              <a:t>把</a:t>
+            </a:r>
+            <a:r>
+              <a:rPr lang="en-US" altLang="zh-CN" dirty="0"/>
+              <a:t>Collection</a:t>
+            </a:r>
+            <a:r>
+              <a:rPr lang="zh-CN" altLang="en-US" dirty="0"/>
+              <a:t>轉化爲</a:t>
+            </a:r>
+            <a:r>
+              <a:rPr lang="en-US" altLang="zh-CN" dirty="0" err="1"/>
+              <a:t>EnumSet</a:t>
+            </a:r>
+            <a:endParaRPr lang="zh-TW" altLang="en-US" dirty="0"/>
+          </a:p>
+        </p:txBody>
+      </p:sp>
+    </p:spTree>
+    <p:extLst>
+      <p:ext uri="{BB962C8B-B14F-4D97-AF65-F5344CB8AC3E}">
+        <p14:creationId xmlns:p14="http://schemas.microsoft.com/office/powerpoint/2010/main" val="2542584799"/>
+      </p:ext>
+    </p:extLst>
+  </p:cSld>
+  <p:clrMapOvr>
+    <a:masterClrMapping/>
+  </p:clrMapOvr>
+</p:sld>
+</file>
+
+<file path=ppt/slides/slide6.xml><?xml version="1.0" encoding="utf-8"?>
+<p:sld xmlns:a="http://schemas.openxmlformats.org/drawingml/2006/main" xmlns:r="http://schemas.openxmlformats.org/officeDocument/2006/relationships" xmlns:p="http://schemas.openxmlformats.org/presentationml/2006/main">
+  <p:cSld>
+    <p:spTree>
+      <p:nvGrpSpPr>
+        <p:cNvPr id="1" name=""/>
+        <p:cNvGrpSpPr/>
+        <p:nvPr/>
+      </p:nvGrpSpPr>
+      <p:grpSpPr>
+        <a:xfrm>
+          <a:off x="0" y="0"/>
+          <a:ext cx="0" cy="0"/>
+          <a:chOff x="0" y="0"/>
+          <a:chExt cx="0" cy="0"/>
+        </a:xfrm>
+      </p:grpSpPr>
+      <p:sp>
+        <p:nvSpPr>
+          <p:cNvPr id="4" name="文字方塊 3">
+            <a:extLst>
+              <a:ext uri="{FF2B5EF4-FFF2-40B4-BE49-F238E27FC236}">
+                <a16:creationId xmlns:a16="http://schemas.microsoft.com/office/drawing/2014/main" id="{4552D417-9AC0-4763-997C-20A9D496AA7E}"/>
+              </a:ext>
+            </a:extLst>
+          </p:cNvPr>
+          <p:cNvSpPr txBox="1"/>
+          <p:nvPr/>
+        </p:nvSpPr>
+        <p:spPr>
+          <a:xfrm>
+            <a:off x="304800" y="274320"/>
+            <a:ext cx="11338560" cy="2400657"/>
+          </a:xfrm>
+          <a:prstGeom prst="rect">
+            <a:avLst/>
+          </a:prstGeom>
+          <a:noFill/>
+        </p:spPr>
+        <p:txBody>
+          <a:bodyPr wrap="square" rtlCol="0">
+            <a:spAutoFit/>
+          </a:bodyPr>
+          <a:lstStyle/>
+          <a:p>
+            <a:r>
+              <a:rPr lang="en-US" altLang="zh-TW" sz="2000" b="1" u="sng" dirty="0"/>
+              <a:t>HashSet,   </a:t>
+            </a:r>
+            <a:r>
+              <a:rPr lang="en-US" altLang="zh-TW" sz="2000" b="1" u="sng" dirty="0" err="1"/>
+              <a:t>TreeSet</a:t>
+            </a:r>
+            <a:r>
+              <a:rPr lang="en-US" altLang="zh-TW" sz="2000" b="1" u="sng" dirty="0"/>
+              <a:t>,  </a:t>
+            </a:r>
+            <a:r>
+              <a:rPr lang="en-US" altLang="zh-TW" sz="2000" b="1" u="sng" dirty="0" err="1"/>
+              <a:t>EnumSet</a:t>
+            </a:r>
+            <a:r>
+              <a:rPr lang="zh-CN" altLang="en-US" sz="2000" b="1" u="sng" dirty="0"/>
+              <a:t>區別</a:t>
+            </a:r>
+            <a:endParaRPr lang="en-US" altLang="zh-CN" sz="2000" b="1" u="sng" dirty="0"/>
+          </a:p>
+          <a:p>
+            <a:endParaRPr lang="en-US" altLang="zh-TW" sz="2000" b="1" u="sng" dirty="0"/>
+          </a:p>
+          <a:p>
+            <a:r>
+              <a:rPr lang="en-US" altLang="zh-CN" dirty="0"/>
+              <a:t>1.</a:t>
+            </a:r>
+            <a:r>
+              <a:rPr lang="en-US" altLang="zh-TW" dirty="0"/>
+              <a:t>HashSet</a:t>
+            </a:r>
+            <a:r>
+              <a:rPr lang="zh-TW" altLang="en-US" dirty="0"/>
+              <a:t>的性能总是比</a:t>
+            </a:r>
+            <a:r>
+              <a:rPr lang="en-US" altLang="zh-TW" dirty="0" err="1"/>
+              <a:t>TreeSet</a:t>
+            </a:r>
+            <a:r>
+              <a:rPr lang="zh-TW" altLang="en-US" dirty="0"/>
+              <a:t>好（特别是最常用的添</a:t>
+            </a:r>
+            <a:r>
+              <a:rPr lang="zh-CN" altLang="en-US" dirty="0"/>
+              <a:t>加、查询元素等操作），因为</a:t>
+            </a:r>
+            <a:r>
+              <a:rPr lang="en-US" altLang="zh-CN" dirty="0" err="1"/>
+              <a:t>TreeSet</a:t>
+            </a:r>
+            <a:r>
+              <a:rPr lang="zh-CN" altLang="en-US" dirty="0"/>
+              <a:t>需要额外的红黑树算法来维护集合元素的次序。只有当需要一个保持排序的</a:t>
+            </a:r>
+            <a:r>
+              <a:rPr lang="en-US" altLang="zh-CN" dirty="0"/>
+              <a:t>Set </a:t>
+            </a:r>
+            <a:r>
+              <a:rPr lang="zh-CN" altLang="en-US" dirty="0"/>
+              <a:t>时， 才应该使用</a:t>
+            </a:r>
+            <a:r>
+              <a:rPr lang="en-US" altLang="zh-TW" dirty="0" err="1"/>
+              <a:t>TreeSet</a:t>
+            </a:r>
+            <a:r>
+              <a:rPr lang="zh-TW" altLang="en-US" dirty="0"/>
+              <a:t>，否则都应该使用</a:t>
+            </a:r>
+            <a:r>
+              <a:rPr lang="en-US" altLang="zh-TW" dirty="0"/>
+              <a:t>HashSet</a:t>
+            </a:r>
+            <a:r>
+              <a:rPr lang="zh-TW" altLang="en-US" dirty="0"/>
+              <a:t>。</a:t>
+            </a:r>
+          </a:p>
+          <a:p>
+            <a:r>
+              <a:rPr lang="en-US" altLang="zh-CN" dirty="0"/>
+              <a:t>2.LinkedHashSet</a:t>
+            </a:r>
+            <a:r>
+              <a:rPr lang="zh-CN" altLang="en-US" dirty="0"/>
+              <a:t>，对于普通的插入、删除操作，</a:t>
+            </a:r>
+            <a:r>
+              <a:rPr lang="en-US" altLang="zh-CN" dirty="0" err="1"/>
+              <a:t>LinkedHashSet</a:t>
+            </a:r>
+            <a:r>
+              <a:rPr lang="zh-CN" altLang="en-US" dirty="0"/>
+              <a:t>比</a:t>
+            </a:r>
+            <a:r>
+              <a:rPr lang="en-US" altLang="zh-CN" dirty="0"/>
+              <a:t>HashSet</a:t>
+            </a:r>
+            <a:r>
+              <a:rPr lang="zh-CN" altLang="en-US" dirty="0"/>
+              <a:t>要略微慢一点，这是由维护链表所带</a:t>
+            </a:r>
+          </a:p>
+          <a:p>
+            <a:r>
+              <a:rPr lang="zh-CN" altLang="en-US" dirty="0"/>
+              <a:t>来的额外开销造成的，但由于有了链表，遍历</a:t>
+            </a:r>
+            <a:r>
+              <a:rPr lang="en-US" altLang="zh-CN" dirty="0" err="1"/>
+              <a:t>LinkedHashSet</a:t>
+            </a:r>
+            <a:r>
+              <a:rPr lang="zh-CN" altLang="en-US" dirty="0"/>
+              <a:t>会更快。</a:t>
+            </a:r>
+          </a:p>
+          <a:p>
+            <a:r>
+              <a:rPr lang="en-US" altLang="zh-CN" dirty="0"/>
+              <a:t>3. </a:t>
+            </a:r>
+            <a:r>
+              <a:rPr lang="en-US" altLang="zh-CN" dirty="0" err="1"/>
+              <a:t>EnumSet</a:t>
+            </a:r>
+            <a:r>
+              <a:rPr lang="zh-CN" altLang="en-US" dirty="0"/>
+              <a:t>是所有</a:t>
+            </a:r>
+            <a:r>
+              <a:rPr lang="en-US" altLang="zh-CN" dirty="0"/>
+              <a:t>Set</a:t>
+            </a:r>
+            <a:r>
+              <a:rPr lang="zh-CN" altLang="en-US" dirty="0"/>
+              <a:t>实现类中性能最好的，但它只能保存同一个枚举类的枚举值作为集合元素。</a:t>
+            </a:r>
+            <a:endParaRPr lang="en-US" altLang="zh-CN" dirty="0"/>
+          </a:p>
+          <a:p>
+            <a:endParaRPr lang="en-US" altLang="zh-TW" sz="2000" u="sng" dirty="0"/>
+          </a:p>
+        </p:txBody>
+      </p:sp>
+    </p:spTree>
+    <p:extLst>
+      <p:ext uri="{BB962C8B-B14F-4D97-AF65-F5344CB8AC3E}">
+        <p14:creationId xmlns:p14="http://schemas.microsoft.com/office/powerpoint/2010/main" val="1657742438"/>
+      </p:ext>
+    </p:extLst>
+  </p:cSld>
+  <p:clrMapOvr>
+    <a:masterClrMapping/>
+  </p:clrMapOvr>
+</p:sld>
+</file>
+
 <file path=ppt/theme/theme1.xml><?xml version="1.0" encoding="utf-8"?>
 <a:theme xmlns:a="http://schemas.openxmlformats.org/drawingml/2006/main" name="Office 佈景主題">
   <a:themeElements>

</xml_diff>

<commit_message>
Add map study in pptx
</commit_message>
<xml_diff>
--- a/JavaStudy/JavaStudyNote/Collection-Map/Java_Set.pptx
+++ b/JavaStudy/JavaStudyNote/Collection-Map/Java_Set.pptx
@@ -264,7 +264,7 @@
           <a:p>
             <a:fld id="{F7D1681C-D9E7-4188-8C9F-C923B7158E01}" type="datetimeFigureOut">
               <a:rPr lang="zh-TW" altLang="en-US" smtClean="0"/>
-              <a:t>2023/2/1</a:t>
+              <a:t>2023/2/7</a:t>
             </a:fld>
             <a:endParaRPr lang="zh-TW" altLang="en-US"/>
           </a:p>
@@ -462,7 +462,7 @@
           <a:p>
             <a:fld id="{F7D1681C-D9E7-4188-8C9F-C923B7158E01}" type="datetimeFigureOut">
               <a:rPr lang="zh-TW" altLang="en-US" smtClean="0"/>
-              <a:t>2023/2/1</a:t>
+              <a:t>2023/2/7</a:t>
             </a:fld>
             <a:endParaRPr lang="zh-TW" altLang="en-US"/>
           </a:p>
@@ -670,7 +670,7 @@
           <a:p>
             <a:fld id="{F7D1681C-D9E7-4188-8C9F-C923B7158E01}" type="datetimeFigureOut">
               <a:rPr lang="zh-TW" altLang="en-US" smtClean="0"/>
-              <a:t>2023/2/1</a:t>
+              <a:t>2023/2/7</a:t>
             </a:fld>
             <a:endParaRPr lang="zh-TW" altLang="en-US"/>
           </a:p>
@@ -868,7 +868,7 @@
           <a:p>
             <a:fld id="{F7D1681C-D9E7-4188-8C9F-C923B7158E01}" type="datetimeFigureOut">
               <a:rPr lang="zh-TW" altLang="en-US" smtClean="0"/>
-              <a:t>2023/2/1</a:t>
+              <a:t>2023/2/7</a:t>
             </a:fld>
             <a:endParaRPr lang="zh-TW" altLang="en-US"/>
           </a:p>
@@ -1143,7 +1143,7 @@
           <a:p>
             <a:fld id="{F7D1681C-D9E7-4188-8C9F-C923B7158E01}" type="datetimeFigureOut">
               <a:rPr lang="zh-TW" altLang="en-US" smtClean="0"/>
-              <a:t>2023/2/1</a:t>
+              <a:t>2023/2/7</a:t>
             </a:fld>
             <a:endParaRPr lang="zh-TW" altLang="en-US"/>
           </a:p>
@@ -1408,7 +1408,7 @@
           <a:p>
             <a:fld id="{F7D1681C-D9E7-4188-8C9F-C923B7158E01}" type="datetimeFigureOut">
               <a:rPr lang="zh-TW" altLang="en-US" smtClean="0"/>
-              <a:t>2023/2/1</a:t>
+              <a:t>2023/2/7</a:t>
             </a:fld>
             <a:endParaRPr lang="zh-TW" altLang="en-US"/>
           </a:p>
@@ -1820,7 +1820,7 @@
           <a:p>
             <a:fld id="{F7D1681C-D9E7-4188-8C9F-C923B7158E01}" type="datetimeFigureOut">
               <a:rPr lang="zh-TW" altLang="en-US" smtClean="0"/>
-              <a:t>2023/2/1</a:t>
+              <a:t>2023/2/7</a:t>
             </a:fld>
             <a:endParaRPr lang="zh-TW" altLang="en-US"/>
           </a:p>
@@ -1961,7 +1961,7 @@
           <a:p>
             <a:fld id="{F7D1681C-D9E7-4188-8C9F-C923B7158E01}" type="datetimeFigureOut">
               <a:rPr lang="zh-TW" altLang="en-US" smtClean="0"/>
-              <a:t>2023/2/1</a:t>
+              <a:t>2023/2/7</a:t>
             </a:fld>
             <a:endParaRPr lang="zh-TW" altLang="en-US"/>
           </a:p>
@@ -2074,7 +2074,7 @@
           <a:p>
             <a:fld id="{F7D1681C-D9E7-4188-8C9F-C923B7158E01}" type="datetimeFigureOut">
               <a:rPr lang="zh-TW" altLang="en-US" smtClean="0"/>
-              <a:t>2023/2/1</a:t>
+              <a:t>2023/2/7</a:t>
             </a:fld>
             <a:endParaRPr lang="zh-TW" altLang="en-US"/>
           </a:p>
@@ -2385,7 +2385,7 @@
           <a:p>
             <a:fld id="{F7D1681C-D9E7-4188-8C9F-C923B7158E01}" type="datetimeFigureOut">
               <a:rPr lang="zh-TW" altLang="en-US" smtClean="0"/>
-              <a:t>2023/2/1</a:t>
+              <a:t>2023/2/7</a:t>
             </a:fld>
             <a:endParaRPr lang="zh-TW" altLang="en-US"/>
           </a:p>
@@ -2673,7 +2673,7 @@
           <a:p>
             <a:fld id="{F7D1681C-D9E7-4188-8C9F-C923B7158E01}" type="datetimeFigureOut">
               <a:rPr lang="zh-TW" altLang="en-US" smtClean="0"/>
-              <a:t>2023/2/1</a:t>
+              <a:t>2023/2/7</a:t>
             </a:fld>
             <a:endParaRPr lang="zh-TW" altLang="en-US"/>
           </a:p>
@@ -2914,7 +2914,7 @@
           <a:p>
             <a:fld id="{F7D1681C-D9E7-4188-8C9F-C923B7158E01}" type="datetimeFigureOut">
               <a:rPr lang="zh-TW" altLang="en-US" smtClean="0"/>
-              <a:t>2023/2/1</a:t>
+              <a:t>2023/2/7</a:t>
             </a:fld>
             <a:endParaRPr lang="zh-TW" altLang="en-US"/>
           </a:p>

</xml_diff>

<commit_message>
Save data in TreeSet, need to use equals and compareTo method
</commit_message>
<xml_diff>
--- a/JavaStudy/JavaStudyNote/Collection-Map/Java_Set.pptx
+++ b/JavaStudy/JavaStudyNote/Collection-Map/Java_Set.pptx
@@ -264,7 +264,7 @@
           <a:p>
             <a:fld id="{F7D1681C-D9E7-4188-8C9F-C923B7158E01}" type="datetimeFigureOut">
               <a:rPr lang="zh-TW" altLang="en-US" smtClean="0"/>
-              <a:t>2023/2/7</a:t>
+              <a:t>2023/2/10</a:t>
             </a:fld>
             <a:endParaRPr lang="zh-TW" altLang="en-US"/>
           </a:p>
@@ -462,7 +462,7 @@
           <a:p>
             <a:fld id="{F7D1681C-D9E7-4188-8C9F-C923B7158E01}" type="datetimeFigureOut">
               <a:rPr lang="zh-TW" altLang="en-US" smtClean="0"/>
-              <a:t>2023/2/7</a:t>
+              <a:t>2023/2/10</a:t>
             </a:fld>
             <a:endParaRPr lang="zh-TW" altLang="en-US"/>
           </a:p>
@@ -670,7 +670,7 @@
           <a:p>
             <a:fld id="{F7D1681C-D9E7-4188-8C9F-C923B7158E01}" type="datetimeFigureOut">
               <a:rPr lang="zh-TW" altLang="en-US" smtClean="0"/>
-              <a:t>2023/2/7</a:t>
+              <a:t>2023/2/10</a:t>
             </a:fld>
             <a:endParaRPr lang="zh-TW" altLang="en-US"/>
           </a:p>
@@ -868,7 +868,7 @@
           <a:p>
             <a:fld id="{F7D1681C-D9E7-4188-8C9F-C923B7158E01}" type="datetimeFigureOut">
               <a:rPr lang="zh-TW" altLang="en-US" smtClean="0"/>
-              <a:t>2023/2/7</a:t>
+              <a:t>2023/2/10</a:t>
             </a:fld>
             <a:endParaRPr lang="zh-TW" altLang="en-US"/>
           </a:p>
@@ -1143,7 +1143,7 @@
           <a:p>
             <a:fld id="{F7D1681C-D9E7-4188-8C9F-C923B7158E01}" type="datetimeFigureOut">
               <a:rPr lang="zh-TW" altLang="en-US" smtClean="0"/>
-              <a:t>2023/2/7</a:t>
+              <a:t>2023/2/10</a:t>
             </a:fld>
             <a:endParaRPr lang="zh-TW" altLang="en-US"/>
           </a:p>
@@ -1408,7 +1408,7 @@
           <a:p>
             <a:fld id="{F7D1681C-D9E7-4188-8C9F-C923B7158E01}" type="datetimeFigureOut">
               <a:rPr lang="zh-TW" altLang="en-US" smtClean="0"/>
-              <a:t>2023/2/7</a:t>
+              <a:t>2023/2/10</a:t>
             </a:fld>
             <a:endParaRPr lang="zh-TW" altLang="en-US"/>
           </a:p>
@@ -1820,7 +1820,7 @@
           <a:p>
             <a:fld id="{F7D1681C-D9E7-4188-8C9F-C923B7158E01}" type="datetimeFigureOut">
               <a:rPr lang="zh-TW" altLang="en-US" smtClean="0"/>
-              <a:t>2023/2/7</a:t>
+              <a:t>2023/2/10</a:t>
             </a:fld>
             <a:endParaRPr lang="zh-TW" altLang="en-US"/>
           </a:p>
@@ -1961,7 +1961,7 @@
           <a:p>
             <a:fld id="{F7D1681C-D9E7-4188-8C9F-C923B7158E01}" type="datetimeFigureOut">
               <a:rPr lang="zh-TW" altLang="en-US" smtClean="0"/>
-              <a:t>2023/2/7</a:t>
+              <a:t>2023/2/10</a:t>
             </a:fld>
             <a:endParaRPr lang="zh-TW" altLang="en-US"/>
           </a:p>
@@ -2074,7 +2074,7 @@
           <a:p>
             <a:fld id="{F7D1681C-D9E7-4188-8C9F-C923B7158E01}" type="datetimeFigureOut">
               <a:rPr lang="zh-TW" altLang="en-US" smtClean="0"/>
-              <a:t>2023/2/7</a:t>
+              <a:t>2023/2/10</a:t>
             </a:fld>
             <a:endParaRPr lang="zh-TW" altLang="en-US"/>
           </a:p>
@@ -2385,7 +2385,7 @@
           <a:p>
             <a:fld id="{F7D1681C-D9E7-4188-8C9F-C923B7158E01}" type="datetimeFigureOut">
               <a:rPr lang="zh-TW" altLang="en-US" smtClean="0"/>
-              <a:t>2023/2/7</a:t>
+              <a:t>2023/2/10</a:t>
             </a:fld>
             <a:endParaRPr lang="zh-TW" altLang="en-US"/>
           </a:p>
@@ -2673,7 +2673,7 @@
           <a:p>
             <a:fld id="{F7D1681C-D9E7-4188-8C9F-C923B7158E01}" type="datetimeFigureOut">
               <a:rPr lang="zh-TW" altLang="en-US" smtClean="0"/>
-              <a:t>2023/2/7</a:t>
+              <a:t>2023/2/10</a:t>
             </a:fld>
             <a:endParaRPr lang="zh-TW" altLang="en-US"/>
           </a:p>
@@ -2914,7 +2914,7 @@
           <a:p>
             <a:fld id="{F7D1681C-D9E7-4188-8C9F-C923B7158E01}" type="datetimeFigureOut">
               <a:rPr lang="zh-TW" altLang="en-US" smtClean="0"/>
-              <a:t>2023/2/7</a:t>
+              <a:t>2023/2/10</a:t>
             </a:fld>
             <a:endParaRPr lang="zh-TW" altLang="en-US"/>
           </a:p>
@@ -3966,7 +3966,7 @@
         <p:spPr>
           <a:xfrm>
             <a:off x="640080" y="1016000"/>
-            <a:ext cx="11196320" cy="4524315"/>
+            <a:ext cx="11196320" cy="5632311"/>
           </a:xfrm>
           <a:prstGeom prst="rect">
             <a:avLst/>
@@ -4297,6 +4297,86 @@
             <a:r>
               <a:rPr lang="zh-TW" altLang="en-US" dirty="0"/>
               <a:t>接口或对实现的排序不能满足需求时在类的外部实现。</a:t>
+            </a:r>
+            <a:endParaRPr lang="en-US" altLang="zh-TW" dirty="0"/>
+          </a:p>
+          <a:p>
+            <a:endParaRPr lang="en-US" altLang="zh-TW" dirty="0"/>
+          </a:p>
+          <a:p>
+            <a:pPr marL="342900" indent="-342900">
+              <a:buAutoNum type="arabicPeriod" startAt="4"/>
+            </a:pPr>
+            <a:r>
+              <a:rPr lang="zh-CN" altLang="en-US" b="1" dirty="0"/>
+              <a:t>插入數據</a:t>
+            </a:r>
+            <a:endParaRPr lang="en-US" altLang="zh-CN" b="1" dirty="0"/>
+          </a:p>
+          <a:p>
+            <a:r>
+              <a:rPr lang="en-US" altLang="zh-TW" dirty="0"/>
+              <a:t>           </a:t>
+            </a:r>
+            <a:r>
+              <a:rPr lang="zh-CN" altLang="en-US" dirty="0"/>
+              <a:t>判斷數據是否重複需要調用存入對象的</a:t>
+            </a:r>
+            <a:r>
+              <a:rPr lang="en-US" altLang="zh-CN" dirty="0"/>
+              <a:t>equals </a:t>
+            </a:r>
+            <a:r>
+              <a:rPr lang="zh-CN" altLang="en-US" dirty="0"/>
+              <a:t>和 </a:t>
+            </a:r>
+            <a:r>
+              <a:rPr lang="en-US" altLang="zh-CN" dirty="0" err="1"/>
+              <a:t>compareTo</a:t>
+            </a:r>
+            <a:r>
+              <a:rPr lang="zh-CN" altLang="en-US" dirty="0"/>
+              <a:t>兩個方法</a:t>
+            </a:r>
+            <a:r>
+              <a:rPr lang="en-US" altLang="zh-CN" dirty="0"/>
+              <a:t>,  </a:t>
+            </a:r>
+            <a:r>
+              <a:rPr lang="en-US" altLang="zh-CN" dirty="0" err="1"/>
+              <a:t>compareTo</a:t>
+            </a:r>
+            <a:r>
+              <a:rPr lang="zh-CN" altLang="en-US" dirty="0"/>
+              <a:t>返回</a:t>
+            </a:r>
+            <a:r>
+              <a:rPr lang="en-US" altLang="zh-CN" dirty="0"/>
+              <a:t>0</a:t>
+            </a:r>
+            <a:r>
+              <a:rPr lang="zh-CN" altLang="en-US" dirty="0"/>
+              <a:t>代表 </a:t>
+            </a:r>
+            <a:r>
+              <a:rPr lang="en-US" altLang="zh-CN" dirty="0"/>
+              <a:t>equals</a:t>
+            </a:r>
+            <a:r>
+              <a:rPr lang="zh-CN" altLang="en-US" dirty="0"/>
+              <a:t>返回</a:t>
+            </a:r>
+            <a:r>
+              <a:rPr lang="en-US" altLang="zh-CN" dirty="0"/>
+              <a:t>true</a:t>
+            </a:r>
+            <a:r>
+              <a:rPr lang="zh-CN" altLang="en-US" dirty="0"/>
+              <a:t>代表存入的對象相等</a:t>
+            </a:r>
+            <a:r>
+              <a:rPr lang="en-US" altLang="zh-CN" dirty="0"/>
+              <a:t>.</a:t>
             </a:r>
             <a:endParaRPr lang="en-US" altLang="zh-TW" dirty="0"/>
           </a:p>

</xml_diff>